<commit_message>
slide with error font
</commit_message>
<xml_diff>
--- a/references/ApplicationOfEnsembleLearningInBankCreditCardRiskModeling.pptx
+++ b/references/ApplicationOfEnsembleLearningInBankCreditCardRiskModeling.pptx
@@ -17974,7 +17974,7 @@
               <a:rPr lang="en-US">
                 <a:latin typeface="Abadi" panose="020B0604020104020204" pitchFamily="34" charset="0"/>
               </a:rPr>
-              <a:t>4/8/2025</a:t>
+              <a:t>4/10/2025</a:t>
             </a:fld>
             <a:endParaRPr dirty="0">
               <a:latin typeface="Abadi" panose="020B0604020104020204" pitchFamily="34" charset="0"/>
@@ -18152,7 +18152,7 @@
             <a:fld id="{3ABD2D7A-D230-4F91-BD59-0A39C2703BA8}" type="datetimeFigureOut">
               <a:rPr lang="en-US" smtClean="0"/>
               <a:pPr/>
-              <a:t>4/8/2025</a:t>
+              <a:t>4/10/2025</a:t>
             </a:fld>
             <a:endParaRPr lang="en-US" dirty="0"/>
           </a:p>
@@ -18715,7 +18715,7 @@
             <a:fld id="{1D2498CD-A622-4ACC-98D8-8365C1B868F0}" type="datetime1">
               <a:rPr lang="en-US" smtClean="0"/>
               <a:pPr/>
-              <a:t>4/8/2025</a:t>
+              <a:t>4/10/2025</a:t>
             </a:fld>
             <a:endParaRPr lang="en-US" dirty="0"/>
           </a:p>
@@ -18931,7 +18931,7 @@
           <a:p>
             <a:fld id="{6EB2CF6B-193C-4CEB-9860-F1C5F0818FA3}" type="datetime1">
               <a:rPr lang="en-US" smtClean="0"/>
-              <a:t>4/8/2025</a:t>
+              <a:t>4/10/2025</a:t>
             </a:fld>
             <a:endParaRPr lang="en-US" dirty="0"/>
           </a:p>
@@ -19126,7 +19126,7 @@
           <a:p>
             <a:fld id="{9856CBC3-4EDC-4C84-BDD0-15F2AD890B92}" type="datetime1">
               <a:rPr lang="en-US" smtClean="0"/>
-              <a:t>4/8/2025</a:t>
+              <a:t>4/10/2025</a:t>
             </a:fld>
             <a:endParaRPr lang="en-US" dirty="0"/>
           </a:p>
@@ -19318,7 +19318,7 @@
           <a:p>
             <a:fld id="{1CEBF3DB-CE40-42F4-BAF4-5D73D1160093}" type="datetime1">
               <a:rPr lang="en-US" smtClean="0"/>
-              <a:t>4/8/2025</a:t>
+              <a:t>4/10/2025</a:t>
             </a:fld>
             <a:endParaRPr lang="en-US" dirty="0"/>
           </a:p>
@@ -19589,7 +19589,7 @@
           <a:p>
             <a:fld id="{23ECA6E5-33C6-44C3-9324-1BC5DF93F43F}" type="datetime1">
               <a:rPr lang="en-US" smtClean="0"/>
-              <a:t>4/8/2025</a:t>
+              <a:t>4/10/2025</a:t>
             </a:fld>
             <a:endParaRPr lang="en-US" dirty="0"/>
           </a:p>
@@ -19901,7 +19901,7 @@
           <a:p>
             <a:fld id="{09C9C1D9-07E1-4387-AF34-89EE2802766D}" type="datetime1">
               <a:rPr lang="en-US" smtClean="0"/>
-              <a:t>4/8/2025</a:t>
+              <a:t>4/10/2025</a:t>
             </a:fld>
             <a:endParaRPr lang="en-US" dirty="0"/>
           </a:p>
@@ -20365,7 +20365,7 @@
           <a:p>
             <a:fld id="{0769E85B-B39A-43E9-82DE-E3279D984288}" type="datetime1">
               <a:rPr lang="en-US" smtClean="0"/>
-              <a:t>4/8/2025</a:t>
+              <a:t>4/10/2025</a:t>
             </a:fld>
             <a:endParaRPr lang="en-US" dirty="0"/>
           </a:p>
@@ -20498,7 +20498,7 @@
           <a:p>
             <a:fld id="{D0270C95-D35D-47FC-816D-E56328637043}" type="datetime1">
               <a:rPr lang="en-US" smtClean="0"/>
-              <a:t>4/8/2025</a:t>
+              <a:t>4/10/2025</a:t>
             </a:fld>
             <a:endParaRPr lang="en-US" dirty="0"/>
           </a:p>
@@ -20608,7 +20608,7 @@
           <a:p>
             <a:fld id="{151163A7-695C-4C09-B334-6924060F5B71}" type="datetime1">
               <a:rPr lang="en-US" smtClean="0"/>
-              <a:t>4/8/2025</a:t>
+              <a:t>4/10/2025</a:t>
             </a:fld>
             <a:endParaRPr lang="en-US" dirty="0"/>
           </a:p>
@@ -20919,7 +20919,7 @@
           <a:p>
             <a:fld id="{FC5B6D02-49B3-41C1-9893-391F698AE757}" type="datetime1">
               <a:rPr lang="en-US" smtClean="0"/>
-              <a:t>4/8/2025</a:t>
+              <a:t>4/10/2025</a:t>
             </a:fld>
             <a:endParaRPr lang="en-US" dirty="0"/>
           </a:p>
@@ -21219,7 +21219,7 @@
           <a:p>
             <a:fld id="{7D91AC91-90B4-40B7-917F-BAE86E369F96}" type="datetime1">
               <a:rPr lang="en-US" smtClean="0"/>
-              <a:t>4/8/2025</a:t>
+              <a:t>4/10/2025</a:t>
             </a:fld>
             <a:endParaRPr lang="en-US" dirty="0"/>
           </a:p>
@@ -21496,7 +21496,7 @@
             <a:fld id="{BB4AB525-F3F4-481A-B8D5-B732FA9EB082}" type="datetime1">
               <a:rPr lang="en-US" smtClean="0"/>
               <a:pPr/>
-              <a:t>4/8/2025</a:t>
+              <a:t>4/10/2025</a:t>
             </a:fld>
             <a:endParaRPr lang="en-US" dirty="0"/>
           </a:p>
@@ -22158,6 +22158,7 @@
           <a:bodyPr/>
           <a:lstStyle/>
           <a:p>
+            <a:pPr algn="ctr"/>
             <a:r>
               <a:rPr lang="en-US" dirty="0"/>
               <a:t>Application of ensemble learning in bank credit card risk modeling </a:t>
@@ -26338,20 +26339,10 @@
           <a:lstStyle/>
           <a:p>
             <a:r>
-              <a:rPr lang="en-US" dirty="0">
-                <a:latin typeface="Abadi" panose="020B0604020104020204" pitchFamily="34" charset="0"/>
-              </a:rPr>
-              <a:t>Ph</a:t>
-            </a:r>
-            <a:r>
-              <a:rPr lang="vi-VN" dirty="0"/>
-              <a:t>ư</a:t>
-            </a:r>
-            <a:r>
-              <a:rPr lang="en-US" dirty="0" err="1">
-                <a:latin typeface="Abadi" panose="020B0604020104020204" pitchFamily="34" charset="0"/>
-              </a:rPr>
-              <a:t>ơng</a:t>
+              <a:rPr lang="en-US" dirty="0" err="1">
+                <a:latin typeface="Abadi" panose="020B0604020104020204" pitchFamily="34" charset="0"/>
+              </a:rPr>
+              <a:t>Phương</a:t>
             </a:r>
             <a:r>
               <a:rPr lang="en-US" dirty="0">
@@ -32893,8 +32884,8 @@
           </a:sp3d>
         </p:spPr>
       </p:pic>
-      <mc:AlternateContent xmlns:mc="http://schemas.openxmlformats.org/markup-compatibility/2006">
-        <mc:Choice xmlns:a14="http://schemas.microsoft.com/office/drawing/2010/main" Requires="a14">
+      <mc:AlternateContent xmlns:mc="http://schemas.openxmlformats.org/markup-compatibility/2006" xmlns:a14="http://schemas.microsoft.com/office/drawing/2010/main">
+        <mc:Choice Requires="a14">
           <p:sp>
             <p:nvSpPr>
               <p:cNvPr id="13" name="TextBox 12">
@@ -33256,7 +33247,7 @@
             </p:txBody>
           </p:sp>
         </mc:Choice>
-        <mc:Fallback>
+        <mc:Fallback xmlns="">
           <p:sp>
             <p:nvSpPr>
               <p:cNvPr id="13" name="TextBox 12">
@@ -38291,8 +38282,8 @@
           </a:sp3d>
         </p:spPr>
       </p:pic>
-      <mc:AlternateContent xmlns:mc="http://schemas.openxmlformats.org/markup-compatibility/2006">
-        <mc:Choice xmlns:a14="http://schemas.microsoft.com/office/drawing/2010/main" Requires="a14">
+      <mc:AlternateContent xmlns:mc="http://schemas.openxmlformats.org/markup-compatibility/2006" xmlns:a14="http://schemas.microsoft.com/office/drawing/2010/main">
+        <mc:Choice Requires="a14">
           <p:sp>
             <p:nvSpPr>
               <p:cNvPr id="14" name="TextBox 13">
@@ -38713,7 +38704,7 @@
             </p:txBody>
           </p:sp>
         </mc:Choice>
-        <mc:Fallback>
+        <mc:Fallback xmlns="">
           <p:sp>
             <p:nvSpPr>
               <p:cNvPr id="14" name="TextBox 13">
@@ -41336,8 +41327,8 @@
           </a:p>
         </p:txBody>
       </p:sp>
-      <mc:AlternateContent xmlns:mc="http://schemas.openxmlformats.org/markup-compatibility/2006">
-        <mc:Choice xmlns:a14="http://schemas.microsoft.com/office/drawing/2010/main" Requires="a14">
+      <mc:AlternateContent xmlns:mc="http://schemas.openxmlformats.org/markup-compatibility/2006" xmlns:a14="http://schemas.microsoft.com/office/drawing/2010/main">
+        <mc:Choice Requires="a14">
           <p:sp>
             <p:nvSpPr>
               <p:cNvPr id="12" name="Rectangle: Rounded Corners 11">
@@ -41446,7 +41437,7 @@
             </p:txBody>
           </p:sp>
         </mc:Choice>
-        <mc:Fallback>
+        <mc:Fallback xmlns="">
           <p:sp>
             <p:nvSpPr>
               <p:cNvPr id="12" name="Rectangle: Rounded Corners 11">

</xml_diff>